<commit_message>
First draft of complete-lecture in data-viz-03
</commit_message>
<xml_diff>
--- a/data-viz-03/component/tutorial-gestalt.pptx
+++ b/data-viz-03/component/tutorial-gestalt.pptx
@@ -5,7 +5,7 @@
     <p:sldMasterId id="2147483648" r:id="rId1"/>
   </p:sldMasterIdLst>
   <p:notesMasterIdLst>
-    <p:NotesMasterId r:id="rId13"/>
+    <p:NotesMasterId r:id="rId14"/>
   </p:notesMasterIdLst>
   <p:sldIdLst>
     <p:sldId id="256" r:id="rId2"/>
@@ -19,6 +19,7 @@
     <p:sldId id="264" r:id="rId10"/>
     <p:sldId id="265" r:id="rId11"/>
     <p:sldId id="266" r:id="rId12"/>
+    <p:sldId id="267" r:id="rId13"/>
   </p:sldIdLst>
   <p:sldSz cx="9144000" cy="6858000" type="screen4x3"/>
   <p:notesSz cx="6858000" cy="9144000"/>
@@ -535,47 +536,39 @@
             </a:pPr>
             <a:r>
               <a:rPr/>
-              <a:t>What</a:t>
-            </a:r>
-            <a:r>
-              <a:rPr/>
-              <a:t> </a:t>
-            </a:r>
-            <a:r>
-              <a:rPr/>
-              <a:t>you</a:t>
-            </a:r>
-            <a:r>
-              <a:rPr/>
-              <a:t> </a:t>
-            </a:r>
-            <a:r>
-              <a:rPr/>
-              <a:t>see</a:t>
-            </a:r>
-            <a:r>
-              <a:rPr/>
-              <a:t> </a:t>
-            </a:r>
-            <a:r>
-              <a:rPr/>
-              <a:t>in</a:t>
-            </a:r>
-            <a:r>
-              <a:rPr/>
-              <a:t> </a:t>
-            </a:r>
-            <a:r>
-              <a:rPr/>
-              <a:t>this</a:t>
-            </a:r>
-            <a:r>
-              <a:rPr/>
-              <a:t> </a:t>
-            </a:r>
-            <a:r>
-              <a:rPr/>
-              <a:t>graph</a:t>
+              <a:t>The</a:t>
+            </a:r>
+            <a:r>
+              <a:rPr/>
+              <a:t> </a:t>
+            </a:r>
+            <a:r>
+              <a:rPr/>
+              <a:t>field</a:t>
+            </a:r>
+            <a:r>
+              <a:rPr/>
+              <a:t> </a:t>
+            </a:r>
+            <a:r>
+              <a:rPr/>
+              <a:t>of</a:t>
+            </a:r>
+            <a:r>
+              <a:rPr/>
+              <a:t> </a:t>
+            </a:r>
+            <a:r>
+              <a:rPr/>
+              <a:t>artistic</a:t>
+            </a:r>
+            <a:r>
+              <a:rPr/>
+              <a:t> </a:t>
+            </a:r>
+            <a:r>
+              <a:rPr/>
+              <a:t>design</a:t>
             </a:r>
             <a:r>
               <a:rPr/>
@@ -591,39 +584,143 @@
             </a:r>
             <a:r>
               <a:rPr/>
-              <a:t>20</a:t>
-            </a:r>
-            <a:r>
-              <a:rPr/>
-              <a:t> </a:t>
-            </a:r>
-            <a:r>
-              <a:rPr/>
-              <a:t>individual</a:t>
-            </a:r>
-            <a:r>
-              <a:rPr/>
-              <a:t> </a:t>
-            </a:r>
-            <a:r>
-              <a:rPr/>
-              <a:t>points.</a:t>
-            </a:r>
-            <a:r>
-              <a:rPr/>
-              <a:t> </a:t>
-            </a:r>
-            <a:r>
-              <a:rPr/>
-              <a:t>When</a:t>
-            </a:r>
-            <a:r>
-              <a:rPr/>
-              <a:t> </a:t>
-            </a:r>
-            <a:r>
-              <a:rPr/>
-              <a:t>you</a:t>
+              <a:t>more</a:t>
+            </a:r>
+            <a:r>
+              <a:rPr/>
+              <a:t> </a:t>
+            </a:r>
+            <a:r>
+              <a:rPr/>
+              <a:t>commonly</a:t>
+            </a:r>
+            <a:r>
+              <a:rPr/>
+              <a:t> </a:t>
+            </a:r>
+            <a:r>
+              <a:rPr/>
+              <a:t>called</a:t>
+            </a:r>
+            <a:r>
+              <a:rPr/>
+              <a:t> </a:t>
+            </a:r>
+            <a:r>
+              <a:rPr/>
+              <a:t>graphic</a:t>
+            </a:r>
+            <a:r>
+              <a:rPr/>
+              <a:t> </a:t>
+            </a:r>
+            <a:r>
+              <a:rPr/>
+              <a:t>design,</a:t>
+            </a:r>
+            <a:r>
+              <a:rPr/>
+              <a:t> </a:t>
+            </a:r>
+            <a:r>
+              <a:rPr/>
+              <a:t>but</a:t>
+            </a:r>
+            <a:r>
+              <a:rPr/>
+              <a:t> </a:t>
+            </a:r>
+            <a:r>
+              <a:rPr/>
+              <a:t>I</a:t>
+            </a:r>
+            <a:r>
+              <a:rPr/>
+              <a:t> </a:t>
+            </a:r>
+            <a:r>
+              <a:rPr/>
+              <a:t>use</a:t>
+            </a:r>
+            <a:r>
+              <a:rPr/>
+              <a:t> </a:t>
+            </a:r>
+            <a:r>
+              <a:rPr/>
+              <a:t>the</a:t>
+            </a:r>
+            <a:r>
+              <a:rPr/>
+              <a:t> </a:t>
+            </a:r>
+            <a:r>
+              <a:rPr/>
+              <a:t>former</a:t>
+            </a:r>
+            <a:r>
+              <a:rPr/>
+              <a:t> </a:t>
+            </a:r>
+            <a:r>
+              <a:rPr/>
+              <a:t>term</a:t>
+            </a:r>
+            <a:r>
+              <a:rPr/>
+              <a:t> </a:t>
+            </a:r>
+            <a:r>
+              <a:rPr/>
+              <a:t>to</a:t>
+            </a:r>
+            <a:r>
+              <a:rPr/>
+              <a:t> </a:t>
+            </a:r>
+            <a:r>
+              <a:rPr/>
+              <a:t>distinguish</a:t>
+            </a:r>
+            <a:r>
+              <a:rPr/>
+              <a:t> </a:t>
+            </a:r>
+            <a:r>
+              <a:rPr/>
+              <a:t>it</a:t>
+            </a:r>
+            <a:r>
+              <a:rPr/>
+              <a:t> </a:t>
+            </a:r>
+            <a:r>
+              <a:rPr/>
+              <a:t>from</a:t>
+            </a:r>
+            <a:r>
+              <a:rPr/>
+              <a:t> </a:t>
+            </a:r>
+            <a:r>
+              <a:rPr/>
+              <a:t>statistical</a:t>
+            </a:r>
+            <a:r>
+              <a:rPr/>
+              <a:t> </a:t>
+            </a:r>
+            <a:r>
+              <a:rPr/>
+              <a:t>graphics.</a:t>
+            </a:r>
+            <a:r>
+              <a:rPr/>
+              <a:t> </a:t>
+            </a:r>
+            <a:r>
+              <a:rPr/>
+              <a:t>Artistic</a:t>
             </a:r>
             <a:r>
               <a:rPr/>
@@ -639,6 +736,94 @@
             </a:r>
             <a:r>
               <a:rPr/>
+              <a:t>is</a:t>
+            </a:r>
+            <a:r>
+              <a:rPr/>
+              <a:t> </a:t>
+            </a:r>
+            <a:r>
+              <a:rPr/>
+              <a:t>the</a:t>
+            </a:r>
+            <a:r>
+              <a:rPr/>
+              <a:t> </a:t>
+            </a:r>
+            <a:r>
+              <a:rPr/>
+              <a:t>use</a:t>
+            </a:r>
+            <a:r>
+              <a:rPr/>
+              <a:t> </a:t>
+            </a:r>
+            <a:r>
+              <a:rPr/>
+              <a:t>of</a:t>
+            </a:r>
+            <a:r>
+              <a:rPr/>
+              <a:t> </a:t>
+            </a:r>
+            <a:r>
+              <a:rPr/>
+              <a:t>typography,</a:t>
+            </a:r>
+            <a:r>
+              <a:rPr/>
+              <a:t> </a:t>
+            </a:r>
+            <a:r>
+              <a:rPr/>
+              <a:t>photography,</a:t>
+            </a:r>
+            <a:r>
+              <a:rPr/>
+              <a:t> </a:t>
+            </a:r>
+            <a:r>
+              <a:rPr/>
+              <a:t>and</a:t>
+            </a:r>
+            <a:r>
+              <a:rPr/>
+              <a:t> </a:t>
+            </a:r>
+            <a:r>
+              <a:rPr/>
+              <a:t>illustration</a:t>
+            </a:r>
+            <a:r>
+              <a:rPr/>
+              <a:t> </a:t>
+            </a:r>
+            <a:r>
+              <a:rPr/>
+              <a:t>to</a:t>
+            </a:r>
+            <a:r>
+              <a:rPr/>
+              <a:t> </a:t>
+            </a:r>
+            <a:r>
+              <a:rPr/>
+              <a:t>effectively</a:t>
+            </a:r>
+            <a:r>
+              <a:rPr/>
+              <a:t> </a:t>
+            </a:r>
+            <a:r>
+              <a:rPr/>
+              <a:t>convey</a:t>
+            </a:r>
+            <a:r>
+              <a:rPr/>
+              <a:t> </a:t>
+            </a:r>
+            <a:r>
+              <a:rPr/>
               <a:t>a</a:t>
             </a:r>
             <a:r>
@@ -647,103 +832,111 @@
             </a:r>
             <a:r>
               <a:rPr/>
-              <a:t>graph,</a:t>
-            </a:r>
-            <a:r>
-              <a:rPr/>
-              <a:t> </a:t>
-            </a:r>
-            <a:r>
-              <a:rPr/>
-              <a:t>you</a:t>
-            </a:r>
-            <a:r>
-              <a:rPr/>
-              <a:t> </a:t>
-            </a:r>
-            <a:r>
-              <a:rPr/>
-              <a:t>want</a:t>
-            </a:r>
-            <a:r>
-              <a:rPr/>
-              <a:t> </a:t>
-            </a:r>
-            <a:r>
-              <a:rPr/>
-              <a:t>people</a:t>
-            </a:r>
-            <a:r>
-              <a:rPr/>
-              <a:t> </a:t>
-            </a:r>
-            <a:r>
-              <a:rPr/>
-              <a:t>to</a:t>
-            </a:r>
-            <a:r>
-              <a:rPr/>
-              <a:t> </a:t>
-            </a:r>
-            <a:r>
-              <a:rPr/>
-              <a:t>group</a:t>
-            </a:r>
-            <a:r>
-              <a:rPr/>
-              <a:t> </a:t>
-            </a:r>
-            <a:r>
-              <a:rPr/>
-              <a:t>things</a:t>
-            </a:r>
-            <a:r>
-              <a:rPr/>
-              <a:t> </a:t>
-            </a:r>
-            <a:r>
-              <a:rPr/>
-              <a:t>in</a:t>
-            </a:r>
-            <a:r>
-              <a:rPr/>
-              <a:t> </a:t>
-            </a:r>
-            <a:r>
-              <a:rPr/>
-              <a:t>a</a:t>
-            </a:r>
-            <a:r>
-              <a:rPr/>
-              <a:t> </a:t>
-            </a:r>
-            <a:r>
-              <a:rPr/>
-              <a:t>way</a:t>
-            </a:r>
-            <a:r>
-              <a:rPr/>
-              <a:t> </a:t>
-            </a:r>
-            <a:r>
-              <a:rPr/>
-              <a:t>to</a:t>
-            </a:r>
-            <a:r>
-              <a:rPr/>
-              <a:t> </a:t>
-            </a:r>
-            <a:r>
-              <a:rPr/>
-              <a:t>reveal</a:t>
-            </a:r>
-            <a:r>
-              <a:rPr/>
-              <a:t> </a:t>
-            </a:r>
-            <a:r>
-              <a:rPr/>
-              <a:t>patterns.</a:t>
+              <a:t>message.</a:t>
+            </a:r>
+            <a:r>
+              <a:rPr/>
+              <a:t> </a:t>
+            </a:r>
+            <a:r>
+              <a:rPr/>
+              <a:t>Artistic</a:t>
+            </a:r>
+            <a:r>
+              <a:rPr/>
+              <a:t> </a:t>
+            </a:r>
+            <a:r>
+              <a:rPr/>
+              <a:t>designers</a:t>
+            </a:r>
+            <a:r>
+              <a:rPr/>
+              <a:t> </a:t>
+            </a:r>
+            <a:r>
+              <a:rPr/>
+              <a:t>work</a:t>
+            </a:r>
+            <a:r>
+              <a:rPr/>
+              <a:t> </a:t>
+            </a:r>
+            <a:r>
+              <a:rPr/>
+              <a:t>on</a:t>
+            </a:r>
+            <a:r>
+              <a:rPr/>
+              <a:t> </a:t>
+            </a:r>
+            <a:r>
+              <a:rPr/>
+              <a:t>commercial</a:t>
+            </a:r>
+            <a:r>
+              <a:rPr/>
+              <a:t> </a:t>
+            </a:r>
+            <a:r>
+              <a:rPr/>
+              <a:t>logos,</a:t>
+            </a:r>
+            <a:r>
+              <a:rPr/>
+              <a:t> </a:t>
+            </a:r>
+            <a:r>
+              <a:rPr/>
+              <a:t>magazines</a:t>
+            </a:r>
+            <a:r>
+              <a:rPr/>
+              <a:t> </a:t>
+            </a:r>
+            <a:r>
+              <a:rPr/>
+              <a:t>and</a:t>
+            </a:r>
+            <a:r>
+              <a:rPr/>
+              <a:t> </a:t>
+            </a:r>
+            <a:r>
+              <a:rPr/>
+              <a:t>brochure</a:t>
+            </a:r>
+            <a:r>
+              <a:rPr/>
+              <a:t> </a:t>
+            </a:r>
+            <a:r>
+              <a:rPr/>
+              <a:t>s,</a:t>
+            </a:r>
+            <a:r>
+              <a:rPr/>
+              <a:t> </a:t>
+            </a:r>
+            <a:r>
+              <a:rPr/>
+              <a:t>and</a:t>
+            </a:r>
+            <a:r>
+              <a:rPr/>
+              <a:t> </a:t>
+            </a:r>
+            <a:r>
+              <a:rPr/>
+              <a:t>product</a:t>
+            </a:r>
+            <a:r>
+              <a:rPr/>
+              <a:t> </a:t>
+            </a:r>
+            <a:r>
+              <a:rPr/>
+              <a:t>packaging.</a:t>
             </a:r>
           </a:p>
         </p:txBody>
@@ -766,6 +959,296 @@
             <a:fld id="{18BDFEC3-8487-43E8-A154-7C12CBC1FFF2}" type="slidenum">
               <a:rPr lang="en-US"/>
               <a:t>3</a:t>
+            </a:fld>
+            <a:endParaRPr lang="en-US"/>
+          </a:p>
+        </p:txBody>
+      </p:sp>
+    </p:spTree>
+  </p:cSld>
+</p:notes>
+</file>
+
+<file path=ppt/notesSlides/notesSlide2.xml><?xml version="1.0" encoding="utf-8"?>
+<p:notes xmlns:a="http://schemas.openxmlformats.org/drawingml/2006/main" xmlns:r="http://schemas.openxmlformats.org/officeDocument/2006/relationships" xmlns:p="http://schemas.openxmlformats.org/presentationml/2006/main">
+  <p:cSld>
+    <p:spTree>
+      <p:nvGrpSpPr>
+        <p:cNvPr id="1" name=""/>
+        <p:cNvGrpSpPr/>
+        <p:nvPr/>
+      </p:nvGrpSpPr>
+      <p:grpSpPr>
+        <a:xfrm>
+          <a:off x="0" y="0"/>
+          <a:ext cx="0" cy="0"/>
+          <a:chOff x="0" y="0"/>
+          <a:chExt cx="0" cy="0"/>
+        </a:xfrm>
+      </p:grpSpPr>
+      <p:sp>
+        <p:nvSpPr>
+          <p:cNvPr id="2" name="Slide Image Placeholder 1"/>
+          <p:cNvSpPr>
+            <a:spLocks noGrp="1" noRot="1" noChangeAspect="1"/>
+          </p:cNvSpPr>
+          <p:nvPr>
+            <p:ph type="sldImg"/>
+          </p:nvPr>
+        </p:nvSpPr>
+        <p:spPr/>
+      </p:sp>
+      <p:sp>
+        <p:nvSpPr>
+          <p:cNvPr id="3" name="Notes Placeholder 2"/>
+          <p:cNvSpPr>
+            <a:spLocks noGrp="1"/>
+          </p:cNvSpPr>
+          <p:nvPr>
+            <p:ph type="body" idx="1"/>
+          </p:nvPr>
+        </p:nvSpPr>
+        <p:spPr/>
+        <p:txBody>
+          <a:bodyPr/>
+          <a:lstStyle/>
+          <a:p>
+            <a:pPr lvl="0" marL="0" indent="0">
+              <a:buNone/>
+            </a:pPr>
+            <a:r>
+              <a:rPr/>
+              <a:t>What</a:t>
+            </a:r>
+            <a:r>
+              <a:rPr/>
+              <a:t> </a:t>
+            </a:r>
+            <a:r>
+              <a:rPr/>
+              <a:t>you</a:t>
+            </a:r>
+            <a:r>
+              <a:rPr/>
+              <a:t> </a:t>
+            </a:r>
+            <a:r>
+              <a:rPr/>
+              <a:t>see</a:t>
+            </a:r>
+            <a:r>
+              <a:rPr/>
+              <a:t> </a:t>
+            </a:r>
+            <a:r>
+              <a:rPr/>
+              <a:t>in</a:t>
+            </a:r>
+            <a:r>
+              <a:rPr/>
+              <a:t> </a:t>
+            </a:r>
+            <a:r>
+              <a:rPr/>
+              <a:t>this</a:t>
+            </a:r>
+            <a:r>
+              <a:rPr/>
+              <a:t> </a:t>
+            </a:r>
+            <a:r>
+              <a:rPr/>
+              <a:t>graph</a:t>
+            </a:r>
+            <a:r>
+              <a:rPr/>
+              <a:t> </a:t>
+            </a:r>
+            <a:r>
+              <a:rPr/>
+              <a:t>is</a:t>
+            </a:r>
+            <a:r>
+              <a:rPr/>
+              <a:t> </a:t>
+            </a:r>
+            <a:r>
+              <a:rPr/>
+              <a:t>20</a:t>
+            </a:r>
+            <a:r>
+              <a:rPr/>
+              <a:t> </a:t>
+            </a:r>
+            <a:r>
+              <a:rPr/>
+              <a:t>individual</a:t>
+            </a:r>
+            <a:r>
+              <a:rPr/>
+              <a:t> </a:t>
+            </a:r>
+            <a:r>
+              <a:rPr/>
+              <a:t>points.</a:t>
+            </a:r>
+            <a:r>
+              <a:rPr/>
+              <a:t> </a:t>
+            </a:r>
+            <a:r>
+              <a:rPr/>
+              <a:t>When</a:t>
+            </a:r>
+            <a:r>
+              <a:rPr/>
+              <a:t> </a:t>
+            </a:r>
+            <a:r>
+              <a:rPr/>
+              <a:t>you</a:t>
+            </a:r>
+            <a:r>
+              <a:rPr/>
+              <a:t> </a:t>
+            </a:r>
+            <a:r>
+              <a:rPr/>
+              <a:t>design</a:t>
+            </a:r>
+            <a:r>
+              <a:rPr/>
+              <a:t> </a:t>
+            </a:r>
+            <a:r>
+              <a:rPr/>
+              <a:t>a</a:t>
+            </a:r>
+            <a:r>
+              <a:rPr/>
+              <a:t> </a:t>
+            </a:r>
+            <a:r>
+              <a:rPr/>
+              <a:t>graph,</a:t>
+            </a:r>
+            <a:r>
+              <a:rPr/>
+              <a:t> </a:t>
+            </a:r>
+            <a:r>
+              <a:rPr/>
+              <a:t>you</a:t>
+            </a:r>
+            <a:r>
+              <a:rPr/>
+              <a:t> </a:t>
+            </a:r>
+            <a:r>
+              <a:rPr/>
+              <a:t>want</a:t>
+            </a:r>
+            <a:r>
+              <a:rPr/>
+              <a:t> </a:t>
+            </a:r>
+            <a:r>
+              <a:rPr/>
+              <a:t>people</a:t>
+            </a:r>
+            <a:r>
+              <a:rPr/>
+              <a:t> </a:t>
+            </a:r>
+            <a:r>
+              <a:rPr/>
+              <a:t>to</a:t>
+            </a:r>
+            <a:r>
+              <a:rPr/>
+              <a:t> </a:t>
+            </a:r>
+            <a:r>
+              <a:rPr/>
+              <a:t>group</a:t>
+            </a:r>
+            <a:r>
+              <a:rPr/>
+              <a:t> </a:t>
+            </a:r>
+            <a:r>
+              <a:rPr/>
+              <a:t>things</a:t>
+            </a:r>
+            <a:r>
+              <a:rPr/>
+              <a:t> </a:t>
+            </a:r>
+            <a:r>
+              <a:rPr/>
+              <a:t>in</a:t>
+            </a:r>
+            <a:r>
+              <a:rPr/>
+              <a:t> </a:t>
+            </a:r>
+            <a:r>
+              <a:rPr/>
+              <a:t>a</a:t>
+            </a:r>
+            <a:r>
+              <a:rPr/>
+              <a:t> </a:t>
+            </a:r>
+            <a:r>
+              <a:rPr/>
+              <a:t>way</a:t>
+            </a:r>
+            <a:r>
+              <a:rPr/>
+              <a:t> </a:t>
+            </a:r>
+            <a:r>
+              <a:rPr/>
+              <a:t>to</a:t>
+            </a:r>
+            <a:r>
+              <a:rPr/>
+              <a:t> </a:t>
+            </a:r>
+            <a:r>
+              <a:rPr/>
+              <a:t>reveal</a:t>
+            </a:r>
+            <a:r>
+              <a:rPr/>
+              <a:t> </a:t>
+            </a:r>
+            <a:r>
+              <a:rPr/>
+              <a:t>patterns.</a:t>
+            </a:r>
+          </a:p>
+        </p:txBody>
+      </p:sp>
+      <p:sp>
+        <p:nvSpPr>
+          <p:cNvPr id="4" name="Slide Number Placeholder 3"/>
+          <p:cNvSpPr>
+            <a:spLocks noGrp="1"/>
+          </p:cNvSpPr>
+          <p:nvPr>
+            <p:ph type="sldNum" sz="quarter" idx="10"/>
+          </p:nvPr>
+        </p:nvSpPr>
+        <p:spPr/>
+        <p:txBody>
+          <a:bodyPr/>
+          <a:lstStyle/>
+          <a:p>
+            <a:fld id="{18BDFEC3-8487-43E8-A154-7C12CBC1FFF2}" type="slidenum">
+              <a:rPr lang="en-US"/>
+              <a:t>4</a:t>
             </a:fld>
             <a:endParaRPr lang="en-US"/>
           </a:p>
@@ -3789,7 +4272,7 @@
             </a:pPr>
             <a:r>
               <a:rPr/>
-              <a:t>Data-viz=03,</a:t>
+              <a:t>Data-viz-03,</a:t>
             </a:r>
             <a:r>
               <a:rPr/>
@@ -3941,322 +4424,39 @@
             </a:pPr>
             <a:r>
               <a:rPr/>
-              <a:t>Continuity</a:t>
-            </a:r>
-          </a:p>
-        </p:txBody>
-      </p:sp>
-      <p:sp>
-        <p:nvSpPr>
-          <p:cNvPr id="3" name="Content Placeholder 2"/>
-          <p:cNvSpPr>
-            <a:spLocks noGrp="1"/>
-          </p:cNvSpPr>
-          <p:nvPr>
-            <p:ph idx="1"/>
-          </p:nvPr>
-        </p:nvSpPr>
-        <p:spPr/>
-        <p:txBody>
-          <a:bodyPr/>
-          <a:lstStyle/>
-          <a:p>
-            <a:pPr lvl="0" marL="0" indent="0">
-              <a:buNone/>
-            </a:pPr>
-            <a:r>
-              <a:rPr/>
-              <a:t>((Show example of sloping text))</a:t>
-            </a:r>
-          </a:p>
-        </p:txBody>
-      </p:sp>
-    </p:spTree>
-  </p:cSld>
-</p:sld>
-</file>
-
-<file path=ppt/slides/slide11.xml><?xml version="1.0" encoding="utf-8"?>
-<p:sld xmlns:a="http://schemas.openxmlformats.org/drawingml/2006/main" xmlns:r="http://schemas.openxmlformats.org/officeDocument/2006/relationships" xmlns:p="http://schemas.openxmlformats.org/presentationml/2006/main">
-  <p:cSld>
-    <p:spTree>
-      <p:nvGrpSpPr>
-        <p:cNvPr id="1" name=""/>
-        <p:cNvGrpSpPr/>
-        <p:nvPr/>
-      </p:nvGrpSpPr>
-      <p:grpSpPr>
-        <a:xfrm>
-          <a:off x="0" y="0"/>
-          <a:ext cx="0" cy="0"/>
-          <a:chOff x="0" y="0"/>
-          <a:chExt cx="0" cy="0"/>
-        </a:xfrm>
-      </p:grpSpPr>
-      <p:sp>
-        <p:nvSpPr>
-          <p:cNvPr id="2" name="Title 1"/>
-          <p:cNvSpPr>
-            <a:spLocks noGrp="1"/>
-          </p:cNvSpPr>
-          <p:nvPr>
-            <p:ph type="title"/>
-          </p:nvPr>
-        </p:nvSpPr>
-        <p:spPr/>
-        <p:txBody>
-          <a:bodyPr/>
-          <a:lstStyle/>
-          <a:p>
-            <a:pPr lvl="0" marL="0" indent="0">
-              <a:buNone/>
-            </a:pPr>
-            <a:r>
-              <a:rPr/>
-              <a:t>Changing</a:t>
-            </a:r>
-            <a:r>
-              <a:rPr/>
-              <a:t> </a:t>
-            </a:r>
-            <a:r>
-              <a:rPr/>
-              <a:t>your</a:t>
-            </a:r>
-            <a:r>
-              <a:rPr/>
-              <a:t> </a:t>
-            </a:r>
-            <a:r>
-              <a:rPr/>
-              <a:t>emphasis</a:t>
-            </a:r>
-          </a:p>
-        </p:txBody>
-      </p:sp>
-      <p:sp>
-        <p:nvSpPr>
-          <p:cNvPr id="3" name="Content Placeholder 2"/>
-          <p:cNvSpPr>
-            <a:spLocks noGrp="1"/>
-          </p:cNvSpPr>
-          <p:nvPr>
-            <p:ph idx="1"/>
-          </p:nvPr>
-        </p:nvSpPr>
-        <p:spPr/>
-        <p:txBody>
-          <a:bodyPr/>
-          <a:lstStyle/>
-          <a:p>
-            <a:pPr lvl="0" marL="0" indent="0">
-              <a:buNone/>
-            </a:pPr>
-            <a:r>
-              <a:rPr/>
-              <a:t>((Recreate example from slides 47-50 of Bergen and Iverson))</a:t>
-            </a:r>
-          </a:p>
-        </p:txBody>
-      </p:sp>
-    </p:spTree>
-  </p:cSld>
-</p:sld>
-</file>
-
-<file path=ppt/slides/slide2.xml><?xml version="1.0" encoding="utf-8"?>
-<p:sld xmlns:a="http://schemas.openxmlformats.org/drawingml/2006/main" xmlns:r="http://schemas.openxmlformats.org/officeDocument/2006/relationships" xmlns:p="http://schemas.openxmlformats.org/presentationml/2006/main">
-  <p:cSld>
-    <p:spTree>
-      <p:nvGrpSpPr>
-        <p:cNvPr id="1" name=""/>
-        <p:cNvGrpSpPr/>
-        <p:nvPr/>
-      </p:nvGrpSpPr>
-      <p:grpSpPr>
-        <a:xfrm>
-          <a:off x="0" y="0"/>
-          <a:ext cx="0" cy="0"/>
-          <a:chOff x="0" y="0"/>
-          <a:chExt cx="0" cy="0"/>
-        </a:xfrm>
-      </p:grpSpPr>
-      <p:sp>
-        <p:nvSpPr>
-          <p:cNvPr id="2" name="Title 1"/>
-          <p:cNvSpPr>
-            <a:spLocks noGrp="1"/>
-          </p:cNvSpPr>
-          <p:nvPr>
-            <p:ph type="title"/>
-          </p:nvPr>
-        </p:nvSpPr>
-        <p:spPr/>
-        <p:txBody>
-          <a:bodyPr/>
-          <a:lstStyle/>
-          <a:p>
-            <a:pPr lvl="0" marL="0" indent="0">
-              <a:buNone/>
-            </a:pPr>
-            <a:r>
-              <a:rPr/>
-              <a:t>More</a:t>
-            </a:r>
-            <a:r>
-              <a:rPr/>
-              <a:t> </a:t>
-            </a:r>
-            <a:r>
-              <a:rPr/>
-              <a:t>theory</a:t>
-            </a:r>
-            <a:r>
-              <a:rPr/>
-              <a:t> </a:t>
-            </a:r>
-            <a:r>
-              <a:rPr/>
-              <a:t>–</a:t>
-            </a:r>
-            <a:r>
-              <a:rPr/>
-              <a:t> </a:t>
-            </a:r>
-            <a:r>
-              <a:rPr/>
-              <a:t>The</a:t>
-            </a:r>
-            <a:r>
-              <a:rPr/>
-              <a:t> </a:t>
-            </a:r>
-            <a:r>
-              <a:rPr/>
-              <a:t>gestalt</a:t>
-            </a:r>
-            <a:r>
-              <a:rPr/>
-              <a:t> </a:t>
-            </a:r>
-            <a:r>
-              <a:rPr/>
-              <a:t>of</a:t>
-            </a:r>
-            <a:r>
-              <a:rPr/>
-              <a:t> </a:t>
-            </a:r>
-            <a:r>
-              <a:rPr/>
-              <a:t>graphics</a:t>
-            </a:r>
-          </a:p>
-        </p:txBody>
-      </p:sp>
-      <p:sp>
-        <p:nvSpPr>
-          <p:cNvPr id="3" name="Content Placeholder 2"/>
-          <p:cNvSpPr>
-            <a:spLocks noGrp="1"/>
-          </p:cNvSpPr>
-          <p:nvPr>
-            <p:ph idx="1"/>
-          </p:nvPr>
-        </p:nvSpPr>
-        <p:spPr/>
-        <p:txBody>
-          <a:bodyPr/>
-          <a:lstStyle/>
-          <a:p>
-            <a:pPr lvl="1"/>
-            <a:r>
-              <a:rPr/>
-              <a:t>How do you draw someone’s eye to quickly make certain associations?</a:t>
-            </a:r>
-          </a:p>
-          <a:p>
-            <a:pPr lvl="1"/>
-            <a:r>
-              <a:rPr/>
-              <a:t>These ideas drawn from the Bergen and Iverson workshop.</a:t>
-            </a:r>
-          </a:p>
-          <a:p>
-            <a:pPr lvl="1"/>
-            <a:r>
-              <a:rPr/>
-              <a:t>Gestalt definition</a:t>
-            </a:r>
-          </a:p>
-          <a:p>
-            <a:pPr lvl="2"/>
-            <a:r>
-              <a:rPr/>
-              <a:t>“The whole is greater than the sum of the parts”</a:t>
-            </a:r>
-          </a:p>
-        </p:txBody>
-      </p:sp>
-    </p:spTree>
-  </p:cSld>
-</p:sld>
-</file>
-
-<file path=ppt/slides/slide3.xml><?xml version="1.0" encoding="utf-8"?>
-<p:sld xmlns:a="http://schemas.openxmlformats.org/drawingml/2006/main" xmlns:r="http://schemas.openxmlformats.org/officeDocument/2006/relationships" xmlns:p="http://schemas.openxmlformats.org/presentationml/2006/main">
-  <p:cSld>
-    <p:spTree>
-      <p:nvGrpSpPr>
-        <p:cNvPr id="1" name=""/>
-        <p:cNvGrpSpPr/>
-        <p:nvPr/>
-      </p:nvGrpSpPr>
-      <p:grpSpPr>
-        <a:xfrm>
-          <a:off x="0" y="0"/>
-          <a:ext cx="0" cy="0"/>
-          <a:chOff x="0" y="0"/>
-          <a:chExt cx="0" cy="0"/>
-        </a:xfrm>
-      </p:grpSpPr>
-      <p:sp>
-        <p:nvSpPr>
-          <p:cNvPr id="2" name="Title 1"/>
-          <p:cNvSpPr>
-            <a:spLocks noGrp="1"/>
-          </p:cNvSpPr>
-          <p:nvPr>
-            <p:ph type="title"/>
-          </p:nvPr>
-        </p:nvSpPr>
-        <p:spPr/>
-        <p:txBody>
-          <a:bodyPr/>
-          <a:lstStyle/>
-          <a:p>
-            <a:pPr lvl="0" marL="0" indent="0">
-              <a:buNone/>
-            </a:pPr>
-            <a:r>
-              <a:rPr/>
-              <a:t>A</a:t>
-            </a:r>
-            <a:r>
-              <a:rPr/>
-              <a:t> </a:t>
-            </a:r>
-            <a:r>
-              <a:rPr/>
-              <a:t>block</a:t>
-            </a:r>
-            <a:r>
-              <a:rPr/>
-              <a:t> </a:t>
-            </a:r>
-            <a:r>
-              <a:rPr/>
-              <a:t>of</a:t>
+              <a:t>Enclosure</a:t>
+            </a:r>
+            <a:r>
+              <a:rPr/>
+              <a:t> </a:t>
+            </a:r>
+            <a:r>
+              <a:rPr/>
+              <a:t>for</a:t>
+            </a:r>
+            <a:r>
+              <a:rPr/>
+              <a:t> </a:t>
+            </a:r>
+            <a:r>
+              <a:rPr/>
+              <a:t>emphasis,</a:t>
+            </a:r>
+            <a:r>
+              <a:rPr/>
+              <a:t> </a:t>
+            </a:r>
+            <a:r>
+              <a:rPr/>
+              <a:t>eight</a:t>
+            </a:r>
+            <a:r>
+              <a:rPr/>
+              <a:t> </a:t>
+            </a:r>
+            <a:r>
+              <a:rPr/>
+              <a:t>special</a:t>
             </a:r>
             <a:r>
               <a:rPr/>
@@ -4265,44 +4465,20 @@
             <a:r>
               <a:rPr/>
               <a:t>points</a:t>
-            </a:r>
-            <a:r>
-              <a:rPr/>
-              <a:t> </a:t>
-            </a:r>
-            <a:r>
-              <a:rPr/>
-              <a:t>-</a:t>
-            </a:r>
-            <a:r>
-              <a:rPr/>
-              <a:t> </a:t>
-            </a:r>
-            <a:r>
-              <a:rPr/>
-              <a:t>no</a:t>
-            </a:r>
-            <a:r>
-              <a:rPr/>
-              <a:t> </a:t>
-            </a:r>
-            <a:r>
-              <a:rPr/>
-              <a:t>emphasis</a:t>
             </a:r>
           </a:p>
         </p:txBody>
       </p:sp>
       <p:pic>
         <p:nvPicPr>
-          <p:cNvPr descr="../images/r/block-no-emphasis.png" id="0" name="Picture 1"/>
+          <p:cNvPr descr="../images/r/block-enclosure.png" id="0" name="Picture 1"/>
           <p:cNvPicPr>
             <a:picLocks noGrp="1" noChangeAspect="1"/>
           </p:cNvPicPr>
           <p:nvPr/>
         </p:nvPicPr>
         <p:blipFill>
-          <a:blip r:embed="rId3"/>
+          <a:blip r:embed="rId2"/>
           <a:stretch>
             <a:fillRect/>
           </a:stretch>
@@ -4328,6 +4504,435 @@
 </p:sld>
 </file>
 
+<file path=ppt/slides/slide11.xml><?xml version="1.0" encoding="utf-8"?>
+<p:sld xmlns:a="http://schemas.openxmlformats.org/drawingml/2006/main" xmlns:r="http://schemas.openxmlformats.org/officeDocument/2006/relationships" xmlns:p="http://schemas.openxmlformats.org/presentationml/2006/main">
+  <p:cSld>
+    <p:spTree>
+      <p:nvGrpSpPr>
+        <p:cNvPr id="1" name=""/>
+        <p:cNvGrpSpPr/>
+        <p:nvPr/>
+      </p:nvGrpSpPr>
+      <p:grpSpPr>
+        <a:xfrm>
+          <a:off x="0" y="0"/>
+          <a:ext cx="0" cy="0"/>
+          <a:chOff x="0" y="0"/>
+          <a:chExt cx="0" cy="0"/>
+        </a:xfrm>
+      </p:grpSpPr>
+      <p:sp>
+        <p:nvSpPr>
+          <p:cNvPr id="2" name="Title 1"/>
+          <p:cNvSpPr>
+            <a:spLocks noGrp="1"/>
+          </p:cNvSpPr>
+          <p:nvPr>
+            <p:ph type="title"/>
+          </p:nvPr>
+        </p:nvSpPr>
+        <p:spPr/>
+        <p:txBody>
+          <a:bodyPr/>
+          <a:lstStyle/>
+          <a:p>
+            <a:pPr lvl="0" marL="0" indent="0">
+              <a:buNone/>
+            </a:pPr>
+            <a:r>
+              <a:rPr/>
+              <a:t>Continuity</a:t>
+            </a:r>
+          </a:p>
+        </p:txBody>
+      </p:sp>
+      <p:sp>
+        <p:nvSpPr>
+          <p:cNvPr id="3" name="Content Placeholder 2"/>
+          <p:cNvSpPr>
+            <a:spLocks noGrp="1"/>
+          </p:cNvSpPr>
+          <p:nvPr>
+            <p:ph idx="1"/>
+          </p:nvPr>
+        </p:nvSpPr>
+        <p:spPr/>
+        <p:txBody>
+          <a:bodyPr/>
+          <a:lstStyle/>
+          <a:p>
+            <a:pPr lvl="0" marL="0" indent="0">
+              <a:buNone/>
+            </a:pPr>
+            <a:r>
+              <a:rPr/>
+              <a:t>((Show example of sloping text))</a:t>
+            </a:r>
+          </a:p>
+        </p:txBody>
+      </p:sp>
+    </p:spTree>
+  </p:cSld>
+</p:sld>
+</file>
+
+<file path=ppt/slides/slide12.xml><?xml version="1.0" encoding="utf-8"?>
+<p:sld xmlns:a="http://schemas.openxmlformats.org/drawingml/2006/main" xmlns:r="http://schemas.openxmlformats.org/officeDocument/2006/relationships" xmlns:p="http://schemas.openxmlformats.org/presentationml/2006/main">
+  <p:cSld>
+    <p:spTree>
+      <p:nvGrpSpPr>
+        <p:cNvPr id="1" name=""/>
+        <p:cNvGrpSpPr/>
+        <p:nvPr/>
+      </p:nvGrpSpPr>
+      <p:grpSpPr>
+        <a:xfrm>
+          <a:off x="0" y="0"/>
+          <a:ext cx="0" cy="0"/>
+          <a:chOff x="0" y="0"/>
+          <a:chExt cx="0" cy="0"/>
+        </a:xfrm>
+      </p:grpSpPr>
+      <p:sp>
+        <p:nvSpPr>
+          <p:cNvPr id="2" name="Title 1"/>
+          <p:cNvSpPr>
+            <a:spLocks noGrp="1"/>
+          </p:cNvSpPr>
+          <p:nvPr>
+            <p:ph type="title"/>
+          </p:nvPr>
+        </p:nvSpPr>
+        <p:spPr/>
+        <p:txBody>
+          <a:bodyPr/>
+          <a:lstStyle/>
+          <a:p>
+            <a:pPr lvl="0" marL="0" indent="0">
+              <a:buNone/>
+            </a:pPr>
+            <a:r>
+              <a:rPr/>
+              <a:t>Changing</a:t>
+            </a:r>
+            <a:r>
+              <a:rPr/>
+              <a:t> </a:t>
+            </a:r>
+            <a:r>
+              <a:rPr/>
+              <a:t>your</a:t>
+            </a:r>
+            <a:r>
+              <a:rPr/>
+              <a:t> </a:t>
+            </a:r>
+            <a:r>
+              <a:rPr/>
+              <a:t>emphasis</a:t>
+            </a:r>
+          </a:p>
+        </p:txBody>
+      </p:sp>
+      <p:sp>
+        <p:nvSpPr>
+          <p:cNvPr id="3" name="Content Placeholder 2"/>
+          <p:cNvSpPr>
+            <a:spLocks noGrp="1"/>
+          </p:cNvSpPr>
+          <p:nvPr>
+            <p:ph idx="1"/>
+          </p:nvPr>
+        </p:nvSpPr>
+        <p:spPr/>
+        <p:txBody>
+          <a:bodyPr/>
+          <a:lstStyle/>
+          <a:p>
+            <a:pPr lvl="0" marL="0" indent="0">
+              <a:buNone/>
+            </a:pPr>
+            <a:r>
+              <a:rPr/>
+              <a:t>((Recreate example from slides 47-50 of Bergen and Iverson))</a:t>
+            </a:r>
+          </a:p>
+        </p:txBody>
+      </p:sp>
+    </p:spTree>
+  </p:cSld>
+</p:sld>
+</file>
+
+<file path=ppt/slides/slide2.xml><?xml version="1.0" encoding="utf-8"?>
+<p:sld xmlns:a="http://schemas.openxmlformats.org/drawingml/2006/main" xmlns:r="http://schemas.openxmlformats.org/officeDocument/2006/relationships" xmlns:p="http://schemas.openxmlformats.org/presentationml/2006/main">
+  <p:cSld>
+    <p:spTree>
+      <p:nvGrpSpPr>
+        <p:cNvPr id="1" name=""/>
+        <p:cNvGrpSpPr/>
+        <p:nvPr/>
+      </p:nvGrpSpPr>
+      <p:grpSpPr>
+        <a:xfrm>
+          <a:off x="0" y="0"/>
+          <a:ext cx="0" cy="0"/>
+          <a:chOff x="0" y="0"/>
+          <a:chExt cx="0" cy="0"/>
+        </a:xfrm>
+      </p:grpSpPr>
+      <p:sp>
+        <p:nvSpPr>
+          <p:cNvPr id="2" name="Title 1"/>
+          <p:cNvSpPr>
+            <a:spLocks noGrp="1"/>
+          </p:cNvSpPr>
+          <p:nvPr>
+            <p:ph type="title"/>
+          </p:nvPr>
+        </p:nvSpPr>
+        <p:spPr/>
+        <p:txBody>
+          <a:bodyPr/>
+          <a:lstStyle/>
+          <a:p>
+            <a:pPr lvl="0" marL="0" indent="0">
+              <a:buNone/>
+            </a:pPr>
+            <a:r>
+              <a:rPr/>
+              <a:t>The</a:t>
+            </a:r>
+            <a:r>
+              <a:rPr/>
+              <a:t> </a:t>
+            </a:r>
+            <a:r>
+              <a:rPr/>
+              <a:t>gestalt</a:t>
+            </a:r>
+            <a:r>
+              <a:rPr/>
+              <a:t> </a:t>
+            </a:r>
+            <a:r>
+              <a:rPr/>
+              <a:t>of</a:t>
+            </a:r>
+            <a:r>
+              <a:rPr/>
+              <a:t> </a:t>
+            </a:r>
+            <a:r>
+              <a:rPr/>
+              <a:t>graphics</a:t>
+            </a:r>
+          </a:p>
+        </p:txBody>
+      </p:sp>
+      <p:sp>
+        <p:nvSpPr>
+          <p:cNvPr id="3" name="Content Placeholder 2"/>
+          <p:cNvSpPr>
+            <a:spLocks noGrp="1"/>
+          </p:cNvSpPr>
+          <p:nvPr>
+            <p:ph idx="1"/>
+          </p:nvPr>
+        </p:nvSpPr>
+        <p:spPr/>
+        <p:txBody>
+          <a:bodyPr/>
+          <a:lstStyle/>
+          <a:p>
+            <a:pPr lvl="1"/>
+            <a:r>
+              <a:rPr/>
+              <a:t>These ideas drawn from the Bergen and Iverson workshop.</a:t>
+            </a:r>
+          </a:p>
+          <a:p>
+            <a:pPr lvl="1"/>
+            <a:r>
+              <a:rPr/>
+              <a:t>Gestalt definition</a:t>
+            </a:r>
+          </a:p>
+          <a:p>
+            <a:pPr lvl="2"/>
+            <a:r>
+              <a:rPr/>
+              <a:t>“The whole is greater than the sum of the parts”</a:t>
+            </a:r>
+          </a:p>
+          <a:p>
+            <a:pPr lvl="1"/>
+            <a:r>
+              <a:rPr/>
+              <a:t>How do you draw someone’s eye to quickly make certain associations?</a:t>
+            </a:r>
+          </a:p>
+        </p:txBody>
+      </p:sp>
+    </p:spTree>
+  </p:cSld>
+</p:sld>
+</file>
+
+<file path=ppt/slides/slide3.xml><?xml version="1.0" encoding="utf-8"?>
+<p:sld xmlns:a="http://schemas.openxmlformats.org/drawingml/2006/main" xmlns:r="http://schemas.openxmlformats.org/officeDocument/2006/relationships" xmlns:p="http://schemas.openxmlformats.org/presentationml/2006/main">
+  <p:cSld>
+    <p:spTree>
+      <p:nvGrpSpPr>
+        <p:cNvPr id="1" name=""/>
+        <p:cNvGrpSpPr/>
+        <p:nvPr/>
+      </p:nvGrpSpPr>
+      <p:grpSpPr>
+        <a:xfrm>
+          <a:off x="0" y="0"/>
+          <a:ext cx="0" cy="0"/>
+          <a:chOff x="0" y="0"/>
+          <a:chExt cx="0" cy="0"/>
+        </a:xfrm>
+      </p:grpSpPr>
+      <p:sp>
+        <p:nvSpPr>
+          <p:cNvPr id="2" name="Title 1"/>
+          <p:cNvSpPr>
+            <a:spLocks noGrp="1"/>
+          </p:cNvSpPr>
+          <p:nvPr>
+            <p:ph type="title"/>
+          </p:nvPr>
+        </p:nvSpPr>
+        <p:spPr/>
+        <p:txBody>
+          <a:bodyPr/>
+          <a:lstStyle/>
+          <a:p>
+            <a:pPr lvl="0" marL="0" indent="0">
+              <a:buNone/>
+            </a:pPr>
+            <a:r>
+              <a:rPr/>
+              <a:t>Gestalt</a:t>
+            </a:r>
+            <a:r>
+              <a:rPr/>
+              <a:t> </a:t>
+            </a:r>
+            <a:r>
+              <a:rPr/>
+              <a:t>theory</a:t>
+            </a:r>
+            <a:r>
+              <a:rPr/>
+              <a:t> </a:t>
+            </a:r>
+            <a:r>
+              <a:rPr/>
+              <a:t>in</a:t>
+            </a:r>
+            <a:r>
+              <a:rPr/>
+              <a:t> </a:t>
+            </a:r>
+            <a:r>
+              <a:rPr/>
+              <a:t>artistic</a:t>
+            </a:r>
+            <a:r>
+              <a:rPr/>
+              <a:t> </a:t>
+            </a:r>
+            <a:r>
+              <a:rPr/>
+              <a:t>design</a:t>
+            </a:r>
+          </a:p>
+        </p:txBody>
+      </p:sp>
+      <p:sp>
+        <p:nvSpPr>
+          <p:cNvPr id="3" name="Content Placeholder 2"/>
+          <p:cNvSpPr>
+            <a:spLocks noGrp="1"/>
+          </p:cNvSpPr>
+          <p:nvPr>
+            <p:ph idx="1"/>
+          </p:nvPr>
+        </p:nvSpPr>
+        <p:spPr/>
+        <p:txBody>
+          <a:bodyPr/>
+          <a:lstStyle/>
+          <a:p>
+            <a:pPr lvl="1"/>
+            <a:r>
+              <a:rPr/>
+              <a:t>Many lesssons in effective artistic design</a:t>
+            </a:r>
+          </a:p>
+          <a:p>
+            <a:pPr lvl="2"/>
+            <a:r>
+              <a:rPr>
+                <a:hlinkClick r:id="rId3"/>
+              </a:rPr>
+              <a:t>The Gestalt Principles</a:t>
+            </a:r>
+            <a:r>
+              <a:rPr/>
+              <a:t> Spokane Falls Community College.</a:t>
+            </a:r>
+          </a:p>
+          <a:p>
+            <a:pPr lvl="2"/>
+            <a:r>
+              <a:rPr>
+                <a:hlinkClick r:id="rId4"/>
+              </a:rPr>
+              <a:t>Gestalt Theory</a:t>
+            </a:r>
+            <a:r>
+              <a:rPr/>
+              <a:t> Sophia.</a:t>
+            </a:r>
+          </a:p>
+          <a:p>
+            <a:pPr lvl="2"/>
+            <a:r>
+              <a:rPr>
+                <a:hlinkClick r:id="rId5"/>
+              </a:rPr>
+              <a:t>Gestalt Principles Applied to Design</a:t>
+            </a:r>
+            <a:r>
+              <a:rPr/>
+              <a:t> The Graybox blog, January 19, 2015.</a:t>
+            </a:r>
+          </a:p>
+          <a:p>
+            <a:pPr lvl="2"/>
+            <a:r>
+              <a:rPr>
+                <a:hlinkClick r:id="rId6"/>
+              </a:rPr>
+              <a:t>Gestalt Principles</a:t>
+            </a:r>
+            <a:r>
+              <a:rPr/>
+              <a:t> Interaction Design Foundation.</a:t>
+            </a:r>
+          </a:p>
+        </p:txBody>
+      </p:sp>
+    </p:spTree>
+  </p:cSld>
+</p:sld>
+</file>
+
 <file path=ppt/slides/slide4.xml><?xml version="1.0" encoding="utf-8"?>
 <p:sld xmlns:a="http://schemas.openxmlformats.org/drawingml/2006/main" xmlns:r="http://schemas.openxmlformats.org/officeDocument/2006/relationships" xmlns:p="http://schemas.openxmlformats.org/presentationml/2006/main">
   <p:cSld>
@@ -4365,37 +4970,69 @@
             </a:pPr>
             <a:r>
               <a:rPr/>
-              <a:t>Color</a:t>
-            </a:r>
-            <a:r>
-              <a:rPr/>
-              <a:t> </a:t>
-            </a:r>
-            <a:r>
-              <a:rPr/>
-              <a:t>emphasizes</a:t>
-            </a:r>
-            <a:r>
-              <a:rPr/>
-              <a:t> </a:t>
-            </a:r>
-            <a:r>
-              <a:rPr/>
-              <a:t>rows</a:t>
+              <a:t>A</a:t>
+            </a:r>
+            <a:r>
+              <a:rPr/>
+              <a:t> </a:t>
+            </a:r>
+            <a:r>
+              <a:rPr/>
+              <a:t>block</a:t>
+            </a:r>
+            <a:r>
+              <a:rPr/>
+              <a:t> </a:t>
+            </a:r>
+            <a:r>
+              <a:rPr/>
+              <a:t>of</a:t>
+            </a:r>
+            <a:r>
+              <a:rPr/>
+              <a:t> </a:t>
+            </a:r>
+            <a:r>
+              <a:rPr/>
+              <a:t>points</a:t>
+            </a:r>
+            <a:r>
+              <a:rPr/>
+              <a:t> </a:t>
+            </a:r>
+            <a:r>
+              <a:rPr/>
+              <a:t>-</a:t>
+            </a:r>
+            <a:r>
+              <a:rPr/>
+              <a:t> </a:t>
+            </a:r>
+            <a:r>
+              <a:rPr/>
+              <a:t>no</a:t>
+            </a:r>
+            <a:r>
+              <a:rPr/>
+              <a:t> </a:t>
+            </a:r>
+            <a:r>
+              <a:rPr/>
+              <a:t>emphasis</a:t>
             </a:r>
           </a:p>
         </p:txBody>
       </p:sp>
       <p:pic>
         <p:nvPicPr>
-          <p:cNvPr descr="../images/r/block-color.png" id="0" name="Picture 1"/>
+          <p:cNvPr descr="../images/r/block-no-emphasis.png" id="0" name="Picture 1"/>
           <p:cNvPicPr>
             <a:picLocks noGrp="1" noChangeAspect="1"/>
           </p:cNvPicPr>
           <p:nvPr/>
         </p:nvPicPr>
         <p:blipFill>
-          <a:blip r:embed="rId2"/>
+          <a:blip r:embed="rId3"/>
           <a:stretch>
             <a:fillRect/>
           </a:stretch>
@@ -4458,7 +5095,7 @@
             </a:pPr>
             <a:r>
               <a:rPr/>
-              <a:t>Shape</a:t>
+              <a:t>Color</a:t>
             </a:r>
             <a:r>
               <a:rPr/>
@@ -4474,14 +5111,14 @@
             </a:r>
             <a:r>
               <a:rPr/>
-              <a:t>columns</a:t>
+              <a:t>rows</a:t>
             </a:r>
           </a:p>
         </p:txBody>
       </p:sp>
       <p:pic>
         <p:nvPicPr>
-          <p:cNvPr descr="../images/r/block-shape.png" id="0" name="Picture 1"/>
+          <p:cNvPr descr="../images/r/block-color.png" id="0" name="Picture 1"/>
           <p:cNvPicPr>
             <a:picLocks noGrp="1" noChangeAspect="1"/>
           </p:cNvPicPr>
@@ -4551,46 +5188,30 @@
             </a:pPr>
             <a:r>
               <a:rPr/>
-              <a:t>Double</a:t>
-            </a:r>
-            <a:r>
-              <a:rPr/>
-              <a:t> </a:t>
-            </a:r>
-            <a:r>
-              <a:rPr/>
-              <a:t>up</a:t>
-            </a:r>
-            <a:r>
-              <a:rPr/>
-              <a:t> </a:t>
-            </a:r>
-            <a:r>
-              <a:rPr/>
-              <a:t>for</a:t>
-            </a:r>
-            <a:r>
-              <a:rPr/>
-              <a:t> </a:t>
-            </a:r>
-            <a:r>
-              <a:rPr/>
-              <a:t>stronger</a:t>
-            </a:r>
-            <a:r>
-              <a:rPr/>
-              <a:t> </a:t>
-            </a:r>
-            <a:r>
-              <a:rPr/>
-              <a:t>emphasis</a:t>
+              <a:t>Shape</a:t>
+            </a:r>
+            <a:r>
+              <a:rPr/>
+              <a:t> </a:t>
+            </a:r>
+            <a:r>
+              <a:rPr/>
+              <a:t>emphasizes</a:t>
+            </a:r>
+            <a:r>
+              <a:rPr/>
+              <a:t> </a:t>
+            </a:r>
+            <a:r>
+              <a:rPr/>
+              <a:t>columns</a:t>
             </a:r>
           </a:p>
         </p:txBody>
       </p:sp>
       <p:pic>
         <p:nvPicPr>
-          <p:cNvPr descr="../images/r/block-double-up.png" id="0" name="Picture 1"/>
+          <p:cNvPr descr="../images/r/block-shape.png" id="0" name="Picture 1"/>
           <p:cNvPicPr>
             <a:picLocks noGrp="1" noChangeAspect="1"/>
           </p:cNvPicPr>
@@ -4660,30 +5281,46 @@
             </a:pPr>
             <a:r>
               <a:rPr/>
-              <a:t>Connectedness</a:t>
-            </a:r>
-            <a:r>
-              <a:rPr/>
-              <a:t> </a:t>
-            </a:r>
-            <a:r>
-              <a:rPr/>
-              <a:t>emphasizes</a:t>
-            </a:r>
-            <a:r>
-              <a:rPr/>
-              <a:t> </a:t>
-            </a:r>
-            <a:r>
-              <a:rPr/>
-              <a:t>rows</a:t>
+              <a:t>Double</a:t>
+            </a:r>
+            <a:r>
+              <a:rPr/>
+              <a:t> </a:t>
+            </a:r>
+            <a:r>
+              <a:rPr/>
+              <a:t>up</a:t>
+            </a:r>
+            <a:r>
+              <a:rPr/>
+              <a:t> </a:t>
+            </a:r>
+            <a:r>
+              <a:rPr/>
+              <a:t>for</a:t>
+            </a:r>
+            <a:r>
+              <a:rPr/>
+              <a:t> </a:t>
+            </a:r>
+            <a:r>
+              <a:rPr/>
+              <a:t>stronger</a:t>
+            </a:r>
+            <a:r>
+              <a:rPr/>
+              <a:t> </a:t>
+            </a:r>
+            <a:r>
+              <a:rPr/>
+              <a:t>emphasis</a:t>
             </a:r>
           </a:p>
         </p:txBody>
       </p:sp>
       <p:pic>
         <p:nvPicPr>
-          <p:cNvPr descr="../images/r/block-connectedness.png" id="0" name="Picture 1"/>
+          <p:cNvPr descr="../images/r/block-double-up.png" id="0" name="Picture 1"/>
           <p:cNvPicPr>
             <a:picLocks noGrp="1" noChangeAspect="1"/>
           </p:cNvPicPr>
@@ -4753,30 +5390,30 @@
             </a:pPr>
             <a:r>
               <a:rPr/>
-              <a:t>Proximity</a:t>
-            </a:r>
-            <a:r>
-              <a:rPr/>
-              <a:t> </a:t>
-            </a:r>
-            <a:r>
-              <a:rPr/>
-              <a:t>emphasize</a:t>
-            </a:r>
-            <a:r>
-              <a:rPr/>
-              <a:t> </a:t>
-            </a:r>
-            <a:r>
-              <a:rPr/>
-              <a:t>columns</a:t>
+              <a:t>Connectedness</a:t>
+            </a:r>
+            <a:r>
+              <a:rPr/>
+              <a:t> </a:t>
+            </a:r>
+            <a:r>
+              <a:rPr/>
+              <a:t>emphasizes</a:t>
+            </a:r>
+            <a:r>
+              <a:rPr/>
+              <a:t> </a:t>
+            </a:r>
+            <a:r>
+              <a:rPr/>
+              <a:t>rows</a:t>
             </a:r>
           </a:p>
         </p:txBody>
       </p:sp>
       <p:pic>
         <p:nvPicPr>
-          <p:cNvPr descr="../images/r/block-proximity.png" id="0" name="Picture 1"/>
+          <p:cNvPr descr="../images/r/block-connectedness.png" id="0" name="Picture 1"/>
           <p:cNvPicPr>
             <a:picLocks noGrp="1" noChangeAspect="1"/>
           </p:cNvPicPr>
@@ -4846,54 +5483,30 @@
             </a:pPr>
             <a:r>
               <a:rPr/>
-              <a:t>Enclosure</a:t>
-            </a:r>
-            <a:r>
-              <a:rPr/>
-              <a:t> </a:t>
-            </a:r>
-            <a:r>
-              <a:rPr/>
-              <a:t>for</a:t>
-            </a:r>
-            <a:r>
-              <a:rPr/>
-              <a:t> </a:t>
-            </a:r>
-            <a:r>
-              <a:rPr/>
-              <a:t>emphasis,</a:t>
-            </a:r>
-            <a:r>
-              <a:rPr/>
-              <a:t> </a:t>
-            </a:r>
-            <a:r>
-              <a:rPr/>
-              <a:t>eight</a:t>
-            </a:r>
-            <a:r>
-              <a:rPr/>
-              <a:t> </a:t>
-            </a:r>
-            <a:r>
-              <a:rPr/>
-              <a:t>special</a:t>
-            </a:r>
-            <a:r>
-              <a:rPr/>
-              <a:t> </a:t>
-            </a:r>
-            <a:r>
-              <a:rPr/>
-              <a:t>points</a:t>
+              <a:t>Proximity</a:t>
+            </a:r>
+            <a:r>
+              <a:rPr/>
+              <a:t> </a:t>
+            </a:r>
+            <a:r>
+              <a:rPr/>
+              <a:t>emphasize</a:t>
+            </a:r>
+            <a:r>
+              <a:rPr/>
+              <a:t> </a:t>
+            </a:r>
+            <a:r>
+              <a:rPr/>
+              <a:t>columns</a:t>
             </a:r>
           </a:p>
         </p:txBody>
       </p:sp>
       <p:pic>
         <p:nvPicPr>
-          <p:cNvPr descr="../images/r/block-enclosure.png" id="0" name="Picture 1"/>
+          <p:cNvPr descr="../images/r/block-proximity.png" id="0" name="Picture 1"/>
           <p:cNvPicPr>
             <a:picLocks noGrp="1" noChangeAspect="1"/>
           </p:cNvPicPr>

</xml_diff>